<commit_message>
Final release of the project artifacts and repository
</commit_message>
<xml_diff>
--- a/notes/lessonLearned.pptx
+++ b/notes/lessonLearned.pptx
@@ -2094,13 +2094,13 @@
     </dgm:pt>
   </dgm:ptLst>
   <dgm:cxnLst>
-    <dgm:cxn modelId="{73C82C7F-9315-4992-8DEA-E0F07D7C73E8}" srcId="{F53EB9DF-88E9-4894-8F34-59424907EB6A}" destId="{7B8997F2-0E83-444B-9CCE-4B0DC45EF5F3}" srcOrd="3" destOrd="0" parTransId="{394F1DBA-4355-41B4-9E29-E1B44222148C}" sibTransId="{B5CD90D1-9BAA-4C89-A970-7EDDDFA08B96}"/>
     <dgm:cxn modelId="{6129B0EE-61F7-42E5-B078-DD980BF3F32A}" type="presOf" srcId="{F53EB9DF-88E9-4894-8F34-59424907EB6A}" destId="{0D85692B-AAE0-4E65-BF23-663BB8ABBEBB}" srcOrd="0" destOrd="0" presId="urn:microsoft.com/office/officeart/2005/8/layout/hProcess9"/>
     <dgm:cxn modelId="{17376B8C-ED44-4C06-9DFC-02F4AF5AE9E2}" type="presOf" srcId="{0CE0CE57-C615-4357-A22D-D1A5E621CA33}" destId="{1C4F5318-5D20-462B-91C5-218496289C52}" srcOrd="0" destOrd="0" presId="urn:microsoft.com/office/officeart/2005/8/layout/hProcess9"/>
+    <dgm:cxn modelId="{73C82C7F-9315-4992-8DEA-E0F07D7C73E8}" srcId="{F53EB9DF-88E9-4894-8F34-59424907EB6A}" destId="{7B8997F2-0E83-444B-9CCE-4B0DC45EF5F3}" srcOrd="3" destOrd="0" parTransId="{394F1DBA-4355-41B4-9E29-E1B44222148C}" sibTransId="{B5CD90D1-9BAA-4C89-A970-7EDDDFA08B96}"/>
     <dgm:cxn modelId="{4BF9CAF1-3897-4CD3-82B2-669EF4DD6197}" srcId="{F53EB9DF-88E9-4894-8F34-59424907EB6A}" destId="{0CE0CE57-C615-4357-A22D-D1A5E621CA33}" srcOrd="2" destOrd="0" parTransId="{91AA2AE9-530F-403D-834B-BB2368112414}" sibTransId="{4A1EC25F-1941-4B6D-89DE-D30D8DF366EB}"/>
     <dgm:cxn modelId="{8CB7520C-249E-462C-90CF-25405179B08B}" srcId="{F53EB9DF-88E9-4894-8F34-59424907EB6A}" destId="{7759B556-7E16-4728-8993-82CFB0171580}" srcOrd="4" destOrd="0" parTransId="{DF555E4B-8113-43F2-940E-405D2D6C4704}" sibTransId="{1B2141AC-3512-4356-BCDB-B47BCA239E68}"/>
+    <dgm:cxn modelId="{6BABC244-7496-4910-B9BB-658FDAA509C0}" type="presOf" srcId="{7B8997F2-0E83-444B-9CCE-4B0DC45EF5F3}" destId="{51599E1D-2CBA-4976-BB21-9DAB21D777DC}" srcOrd="0" destOrd="0" presId="urn:microsoft.com/office/officeart/2005/8/layout/hProcess9"/>
     <dgm:cxn modelId="{42657378-331E-4069-B35A-1A86C87BA497}" srcId="{F53EB9DF-88E9-4894-8F34-59424907EB6A}" destId="{C4880649-37AD-4B82-A84F-369FB78B84C2}" srcOrd="0" destOrd="0" parTransId="{D4ACD46C-2620-4C49-AAEF-744706531830}" sibTransId="{ECBBDEF4-0FC3-4E70-BB99-DA3AF110EFF9}"/>
-    <dgm:cxn modelId="{6BABC244-7496-4910-B9BB-658FDAA509C0}" type="presOf" srcId="{7B8997F2-0E83-444B-9CCE-4B0DC45EF5F3}" destId="{51599E1D-2CBA-4976-BB21-9DAB21D777DC}" srcOrd="0" destOrd="0" presId="urn:microsoft.com/office/officeart/2005/8/layout/hProcess9"/>
     <dgm:cxn modelId="{DFF798B7-0E0F-4519-96F9-AB2D284DC102}" srcId="{F53EB9DF-88E9-4894-8F34-59424907EB6A}" destId="{D4F94E43-BD4E-4E19-BAC9-90B8E5592DD9}" srcOrd="1" destOrd="0" parTransId="{7AD31B78-3B52-4000-A614-F2DF2A019F36}" sibTransId="{75C24D44-5294-4045-B755-3ABC7DBB309F}"/>
     <dgm:cxn modelId="{C9972CDF-3C23-4D6B-876B-3D21BCDDA181}" type="presOf" srcId="{7759B556-7E16-4728-8993-82CFB0171580}" destId="{3E360B13-B290-42D2-AC86-5C5FC48D2842}" srcOrd="0" destOrd="0" presId="urn:microsoft.com/office/officeart/2005/8/layout/hProcess9"/>
     <dgm:cxn modelId="{46F96795-746C-4D4B-8D8E-FA826F65FE2F}" type="presOf" srcId="{D4F94E43-BD4E-4E19-BAC9-90B8E5592DD9}" destId="{099174C4-A649-4823-8659-6CA0A94F888E}" srcOrd="0" destOrd="0" presId="urn:microsoft.com/office/officeart/2005/8/layout/hProcess9"/>
@@ -2345,6 +2345,13 @@
         </dgm:presLayoutVars>
       </dgm:prSet>
       <dgm:spPr/>
+      <dgm:t>
+        <a:bodyPr/>
+        <a:lstStyle/>
+        <a:p>
+          <a:endParaRPr lang="en-US"/>
+        </a:p>
+      </dgm:t>
     </dgm:pt>
     <dgm:pt modelId="{6D57B651-1257-49EF-B361-B4555FA3A4B1}" type="pres">
       <dgm:prSet presAssocID="{273DF7AD-4739-4D6B-8DA2-78A9823E02F8}" presName="sibTrans" presStyleCnt="0"/>
@@ -2376,6 +2383,13 @@
         </dgm:presLayoutVars>
       </dgm:prSet>
       <dgm:spPr/>
+      <dgm:t>
+        <a:bodyPr/>
+        <a:lstStyle/>
+        <a:p>
+          <a:endParaRPr lang="en-US"/>
+        </a:p>
+      </dgm:t>
     </dgm:pt>
   </dgm:ptLst>
   <dgm:cxnLst>
@@ -5876,7 +5890,7 @@
           <a:p>
             <a:fld id="{747E30E7-5212-46F5-8AA5-1DC2CEE2B3BD}" type="datetimeFigureOut">
               <a:rPr lang="en-US" smtClean="0"/>
-              <a:t>5/24/2016</a:t>
+              <a:t>5/28/2016</a:t>
             </a:fld>
             <a:endParaRPr lang="en-US"/>
           </a:p>
@@ -7184,7 +7198,7 @@
             <a:fld id="{1D8BD707-D9CF-40AE-B4C6-C98DA3205C09}" type="datetimeFigureOut">
               <a:rPr lang="en-US" smtClean="0"/>
               <a:pPr/>
-              <a:t>5/24/2016</a:t>
+              <a:t>5/28/2016</a:t>
             </a:fld>
             <a:endParaRPr lang="en-US"/>
           </a:p>
@@ -7356,7 +7370,7 @@
             <a:fld id="{1D8BD707-D9CF-40AE-B4C6-C98DA3205C09}" type="datetimeFigureOut">
               <a:rPr lang="en-US" smtClean="0"/>
               <a:pPr/>
-              <a:t>5/24/2016</a:t>
+              <a:t>5/28/2016</a:t>
             </a:fld>
             <a:endParaRPr lang="en-US"/>
           </a:p>
@@ -7533,7 +7547,7 @@
             <a:fld id="{1D8BD707-D9CF-40AE-B4C6-C98DA3205C09}" type="datetimeFigureOut">
               <a:rPr lang="en-US" smtClean="0"/>
               <a:pPr/>
-              <a:t>5/24/2016</a:t>
+              <a:t>5/28/2016</a:t>
             </a:fld>
             <a:endParaRPr lang="en-US"/>
           </a:p>
@@ -7700,7 +7714,7 @@
             <a:fld id="{1D8BD707-D9CF-40AE-B4C6-C98DA3205C09}" type="datetimeFigureOut">
               <a:rPr lang="en-US" smtClean="0"/>
               <a:pPr/>
-              <a:t>5/24/2016</a:t>
+              <a:t>5/28/2016</a:t>
             </a:fld>
             <a:endParaRPr lang="en-US"/>
           </a:p>
@@ -7959,7 +7973,7 @@
             <a:fld id="{1D8BD707-D9CF-40AE-B4C6-C98DA3205C09}" type="datetimeFigureOut">
               <a:rPr lang="en-US" smtClean="0"/>
               <a:pPr/>
-              <a:t>5/24/2016</a:t>
+              <a:t>5/28/2016</a:t>
             </a:fld>
             <a:endParaRPr lang="en-US"/>
           </a:p>
@@ -8101,7 +8115,7 @@
             <a:fld id="{1D8BD707-D9CF-40AE-B4C6-C98DA3205C09}" type="datetimeFigureOut">
               <a:rPr lang="en-US" smtClean="0"/>
               <a:pPr/>
-              <a:t>5/24/2016</a:t>
+              <a:t>5/28/2016</a:t>
             </a:fld>
             <a:endParaRPr lang="en-US"/>
           </a:p>
@@ -8753,7 +8767,7 @@
             <a:fld id="{1D8BD707-D9CF-40AE-B4C6-C98DA3205C09}" type="datetimeFigureOut">
               <a:rPr lang="en-US" smtClean="0"/>
               <a:pPr/>
-              <a:t>5/24/2016</a:t>
+              <a:t>5/28/2016</a:t>
             </a:fld>
             <a:endParaRPr lang="en-US"/>
           </a:p>
@@ -8868,7 +8882,7 @@
             <a:fld id="{1D8BD707-D9CF-40AE-B4C6-C98DA3205C09}" type="datetimeFigureOut">
               <a:rPr lang="en-US" smtClean="0"/>
               <a:pPr/>
-              <a:t>5/24/2016</a:t>
+              <a:t>5/28/2016</a:t>
             </a:fld>
             <a:endParaRPr lang="en-US"/>
           </a:p>
@@ -8960,7 +8974,7 @@
             <a:fld id="{1D8BD707-D9CF-40AE-B4C6-C98DA3205C09}" type="datetimeFigureOut">
               <a:rPr lang="en-US" smtClean="0"/>
               <a:pPr/>
-              <a:t>5/24/2016</a:t>
+              <a:t>5/28/2016</a:t>
             </a:fld>
             <a:endParaRPr lang="en-US"/>
           </a:p>
@@ -9252,7 +9266,7 @@
             <a:fld id="{1D8BD707-D9CF-40AE-B4C6-C98DA3205C09}" type="datetimeFigureOut">
               <a:rPr lang="en-US" smtClean="0"/>
               <a:pPr/>
-              <a:t>5/24/2016</a:t>
+              <a:t>5/28/2016</a:t>
             </a:fld>
             <a:endParaRPr lang="en-US"/>
           </a:p>
@@ -9577,7 +9591,7 @@
             <a:fld id="{1D8BD707-D9CF-40AE-B4C6-C98DA3205C09}" type="datetimeFigureOut">
               <a:rPr lang="en-US" smtClean="0"/>
               <a:pPr/>
-              <a:t>5/24/2016</a:t>
+              <a:t>5/28/2016</a:t>
             </a:fld>
             <a:endParaRPr lang="en-US"/>
           </a:p>
@@ -10036,7 +10050,7 @@
             <a:fld id="{1D8BD707-D9CF-40AE-B4C6-C98DA3205C09}" type="datetimeFigureOut">
               <a:rPr lang="en-US" smtClean="0"/>
               <a:pPr/>
-              <a:t>5/24/2016</a:t>
+              <a:t>5/28/2016</a:t>
             </a:fld>
             <a:endParaRPr lang="en-US"/>
           </a:p>
@@ -16743,11 +16757,11 @@
   <p:clrMapOvr>
     <a:masterClrMapping/>
   </p:clrMapOvr>
-  <mc:AlternateContent xmlns:mc="http://schemas.openxmlformats.org/markup-compatibility/2006">
-    <mc:Choice xmlns:p14="http://schemas.microsoft.com/office/powerpoint/2010/main" Requires="p14">
+  <mc:AlternateContent xmlns:mc="http://schemas.openxmlformats.org/markup-compatibility/2006" xmlns:p14="http://schemas.microsoft.com/office/powerpoint/2010/main">
+    <mc:Choice Requires="p14">
       <p:transition spd="slow" p14:dur="2000"/>
     </mc:Choice>
-    <mc:Fallback>
+    <mc:Fallback xmlns="">
       <p:transition spd="slow"/>
     </mc:Fallback>
   </mc:AlternateContent>
@@ -16924,15 +16938,7 @@
             </a:br>
             <a:r>
               <a:rPr lang="nb-NO" sz="2800" dirty="0" smtClean="0"/>
-              <a:t>Build an application for </a:t>
-            </a:r>
-            <a:r>
-              <a:rPr lang="nb-NO" sz="2800" dirty="0" smtClean="0"/>
-              <a:t>next word </a:t>
-            </a:r>
-            <a:r>
-              <a:rPr lang="nb-NO" sz="2800" dirty="0" smtClean="0"/>
-              <a:t>prediction</a:t>
+              <a:t>Build an application for next word prediction</a:t>
             </a:r>
             <a:endParaRPr lang="en-US" sz="2800" dirty="0"/>
           </a:p>
@@ -17104,15 +17110,7 @@
             <a:pPr algn="r"/>
             <a:r>
               <a:rPr lang="nb-NO" sz="4400" dirty="0" smtClean="0"/>
-              <a:t>The </a:t>
-            </a:r>
-            <a:r>
-              <a:rPr lang="nb-NO" sz="4400" dirty="0" smtClean="0"/>
-              <a:t>Supporting Corpora</a:t>
-            </a:r>
-            <a:r>
-              <a:rPr lang="nb-NO" sz="4400" dirty="0" smtClean="0"/>
-              <a:t>:</a:t>
+              <a:t>The Supporting Corpora:</a:t>
             </a:r>
             <a:br>
               <a:rPr lang="nb-NO" sz="4400" dirty="0" smtClean="0"/>
@@ -18144,29 +18142,8 @@
                   <a:schemeClr val="bg1"/>
                 </a:solidFill>
               </a:rPr>
-              <a:t>60</a:t>
-            </a:r>
-            <a:r>
-              <a:rPr lang="nb-NO" sz="1100" dirty="0" smtClean="0">
-                <a:solidFill>
-                  <a:schemeClr val="bg1"/>
-                </a:solidFill>
-              </a:rPr>
-              <a:t>% of the original corpora for creating the language </a:t>
-            </a:r>
-            <a:r>
-              <a:rPr lang="nb-NO" sz="1100" dirty="0" smtClean="0">
-                <a:solidFill>
-                  <a:schemeClr val="bg1"/>
-                </a:solidFill>
-              </a:rPr>
-              <a:t>model (random sampling).</a:t>
-            </a:r>
-            <a:endParaRPr lang="nb-NO" sz="1100" dirty="0" smtClean="0">
-              <a:solidFill>
-                <a:schemeClr val="bg1"/>
-              </a:solidFill>
-            </a:endParaRPr>
+              <a:t>60% of the original corpora for creating the language model (random sampling).</a:t>
+            </a:r>
           </a:p>
           <a:p>
             <a:endParaRPr lang="nb-NO" sz="1100" dirty="0">
@@ -18716,15 +18693,7 @@
                   <a:schemeClr val="bg1"/>
                 </a:solidFill>
               </a:rPr>
-              <a:t>the, </a:t>
-            </a:r>
-            <a:r>
-              <a:rPr lang="nb-NO" sz="1100" dirty="0" smtClean="0">
-                <a:solidFill>
-                  <a:schemeClr val="bg1"/>
-                </a:solidFill>
-              </a:rPr>
-              <a:t>477030</a:t>
+              <a:t>the, 477030</a:t>
             </a:r>
           </a:p>
           <a:p>
@@ -18928,15 +18897,7 @@
                   <a:schemeClr val="bg1"/>
                 </a:solidFill>
               </a:rPr>
-              <a:t>Term </a:t>
-            </a:r>
-            <a:r>
-              <a:rPr lang="nb-NO" sz="1100" b="1" dirty="0" smtClean="0">
-                <a:solidFill>
-                  <a:schemeClr val="bg1"/>
-                </a:solidFill>
-              </a:rPr>
-              <a:t>Frequency Matrices (TFM)</a:t>
+              <a:t>Term Frequency Matrices (TFM)</a:t>
             </a:r>
             <a:r>
               <a:rPr lang="nb-NO" sz="1100" dirty="0" smtClean="0">
@@ -18944,15 +18905,7 @@
                   <a:schemeClr val="bg1"/>
                 </a:solidFill>
               </a:rPr>
-              <a:t> for unigrams, bigrams and trigrams</a:t>
-            </a:r>
-            <a:r>
-              <a:rPr lang="nb-NO" sz="1100" dirty="0" smtClean="0">
-                <a:solidFill>
-                  <a:schemeClr val="bg1"/>
-                </a:solidFill>
-              </a:rPr>
-              <a:t>.</a:t>
+              <a:t> for unigrams, bigrams and trigrams.</a:t>
             </a:r>
             <a:endParaRPr lang="en-US" sz="1100" dirty="0">
               <a:solidFill>
@@ -19043,11 +18996,6 @@
               </a:rPr>
               <a:t>Reducing the vocabulary in order to decrease the memory footprint of the model</a:t>
             </a:r>
-            <a:endParaRPr lang="nb-NO" sz="1100" dirty="0" smtClean="0">
-              <a:solidFill>
-                <a:schemeClr val="bg1"/>
-              </a:solidFill>
-            </a:endParaRPr>
           </a:p>
           <a:p>
             <a:endParaRPr lang="nb-NO" sz="1100" dirty="0" smtClean="0">
@@ -19267,11 +19215,6 @@
               </a:rPr>
               <a:t>Calculate the «Stupid» backoff score and create an ad-hoc dats structure representing the language the model.</a:t>
             </a:r>
-            <a:endParaRPr lang="nb-NO" sz="1100" dirty="0" smtClean="0">
-              <a:solidFill>
-                <a:schemeClr val="bg1"/>
-              </a:solidFill>
-            </a:endParaRPr>
           </a:p>
           <a:p>
             <a:endParaRPr lang="nb-NO" sz="1100" dirty="0" smtClean="0">
@@ -19718,8 +19661,8 @@
             <a:chExt cx="4781669" cy="2956193"/>
           </a:xfrm>
         </p:grpSpPr>
-        <mc:AlternateContent xmlns:mc="http://schemas.openxmlformats.org/markup-compatibility/2006">
-          <mc:Choice xmlns:a14="http://schemas.microsoft.com/office/drawing/2010/main" Requires="a14">
+        <mc:AlternateContent xmlns:mc="http://schemas.openxmlformats.org/markup-compatibility/2006" xmlns:a14="http://schemas.microsoft.com/office/drawing/2010/main">
+          <mc:Choice Requires="a14">
             <p:sp>
               <p:nvSpPr>
                 <p:cNvPr id="5" name="Rounded Rectangle 4"/>
@@ -19863,7 +19806,7 @@
               </p:txBody>
             </p:sp>
           </mc:Choice>
-          <mc:Fallback>
+          <mc:Fallback xmlns="">
             <p:sp>
               <p:nvSpPr>
                 <p:cNvPr id="5" name="Rounded Rectangle 4"/>
@@ -19935,8 +19878,8 @@
             </a:fontRef>
           </p:style>
         </p:cxnSp>
-        <mc:AlternateContent xmlns:mc="http://schemas.openxmlformats.org/markup-compatibility/2006">
-          <mc:Choice xmlns:a14="http://schemas.microsoft.com/office/drawing/2010/main" Requires="a14">
+        <mc:AlternateContent xmlns:mc="http://schemas.openxmlformats.org/markup-compatibility/2006" xmlns:a14="http://schemas.microsoft.com/office/drawing/2010/main">
+          <mc:Choice Requires="a14">
             <p:sp>
               <p:nvSpPr>
                 <p:cNvPr id="7" name="TextBox 6"/>
@@ -19959,6 +19902,7 @@
                 </a:bodyPr>
                 <a:lstStyle/>
                 <a:p>
+                  <a:pPr/>
                   <a14:m>
                     <m:oMathPara xmlns:m="http://schemas.openxmlformats.org/officeDocument/2006/math">
                       <m:oMathParaPr>
@@ -20017,7 +19961,7 @@
                                   <a:rPr lang="nb-NO" sz="1400" b="0" i="0" smtClean="0">
                                     <a:latin typeface="Cambria Math"/>
                                   </a:rPr>
-                                  <m:t>-2</m:t>
+                                  <m:t>−2</m:t>
                                 </m:r>
                                 <m:r>
                                   <a:rPr lang="nb-NO" sz="1400" b="0" i="1" smtClean="0">
@@ -20141,7 +20085,7 @@
               </p:txBody>
             </p:sp>
           </mc:Choice>
-          <mc:Fallback>
+          <mc:Fallback xmlns="">
             <p:sp>
               <p:nvSpPr>
                 <p:cNvPr id="7" name="TextBox 6"/>
@@ -20210,8 +20154,8 @@
             </a:p>
           </p:txBody>
         </p:sp>
-        <mc:AlternateContent xmlns:mc="http://schemas.openxmlformats.org/markup-compatibility/2006">
-          <mc:Choice xmlns:a14="http://schemas.microsoft.com/office/drawing/2010/main" Requires="a14">
+        <mc:AlternateContent xmlns:mc="http://schemas.openxmlformats.org/markup-compatibility/2006" xmlns:a14="http://schemas.microsoft.com/office/drawing/2010/main">
+          <mc:Choice Requires="a14">
             <p:sp>
               <p:nvSpPr>
                 <p:cNvPr id="9" name="Rounded Rectangle 8"/>
@@ -20319,7 +20263,7 @@
               </p:txBody>
             </p:sp>
           </mc:Choice>
-          <mc:Fallback>
+          <mc:Fallback xmlns="">
             <p:sp>
               <p:nvSpPr>
                 <p:cNvPr id="9" name="Rounded Rectangle 8"/>
@@ -20393,8 +20337,8 @@
             </a:fontRef>
           </p:style>
         </p:cxnSp>
-        <mc:AlternateContent xmlns:mc="http://schemas.openxmlformats.org/markup-compatibility/2006">
-          <mc:Choice xmlns:a14="http://schemas.microsoft.com/office/drawing/2010/main" Requires="a14">
+        <mc:AlternateContent xmlns:mc="http://schemas.openxmlformats.org/markup-compatibility/2006" xmlns:a14="http://schemas.microsoft.com/office/drawing/2010/main">
+          <mc:Choice Requires="a14">
             <p:sp>
               <p:nvSpPr>
                 <p:cNvPr id="11" name="TextBox 10"/>
@@ -20538,7 +20482,7 @@
               </p:txBody>
             </p:sp>
           </mc:Choice>
-          <mc:Fallback>
+          <mc:Fallback xmlns="">
             <p:sp>
               <p:nvSpPr>
                 <p:cNvPr id="11" name="TextBox 10"/>
@@ -20607,8 +20551,8 @@
             </a:p>
           </p:txBody>
         </p:sp>
-        <mc:AlternateContent xmlns:mc="http://schemas.openxmlformats.org/markup-compatibility/2006">
-          <mc:Choice xmlns:a14="http://schemas.microsoft.com/office/drawing/2010/main" Requires="a14">
+        <mc:AlternateContent xmlns:mc="http://schemas.openxmlformats.org/markup-compatibility/2006" xmlns:a14="http://schemas.microsoft.com/office/drawing/2010/main">
+          <mc:Choice Requires="a14">
             <p:sp>
               <p:nvSpPr>
                 <p:cNvPr id="13" name="Rounded Rectangle 12"/>
@@ -20692,7 +20636,7 @@
               </p:txBody>
             </p:sp>
           </mc:Choice>
-          <mc:Fallback>
+          <mc:Fallback xmlns="">
             <p:sp>
               <p:nvSpPr>
                 <p:cNvPr id="13" name="Rounded Rectangle 12"/>
@@ -20766,8 +20710,8 @@
             </a:fontRef>
           </p:style>
         </p:cxnSp>
-        <mc:AlternateContent xmlns:mc="http://schemas.openxmlformats.org/markup-compatibility/2006">
-          <mc:Choice xmlns:a14="http://schemas.microsoft.com/office/drawing/2010/main" Requires="a14">
+        <mc:AlternateContent xmlns:mc="http://schemas.openxmlformats.org/markup-compatibility/2006" xmlns:a14="http://schemas.microsoft.com/office/drawing/2010/main">
+          <mc:Choice Requires="a14">
             <p:sp>
               <p:nvSpPr>
                 <p:cNvPr id="15" name="TextBox 14"/>
@@ -20850,14 +20794,14 @@
                   </a14:m>
                   <a:r>
                     <a:rPr lang="en-US" sz="1400" dirty="0" smtClean="0"/>
-                    <a:t> * 0.4)* 0.4</a:t>
+                    <a:t> * 0.4* 0.4</a:t>
                   </a:r>
                   <a:endParaRPr lang="en-US" sz="1400" dirty="0"/>
                 </a:p>
               </p:txBody>
             </p:sp>
           </mc:Choice>
-          <mc:Fallback>
+          <mc:Fallback xmlns="">
             <p:sp>
               <p:nvSpPr>
                 <p:cNvPr id="15" name="TextBox 14"/>
@@ -20877,7 +20821,7 @@
                 <a:blipFill rotWithShape="1">
                   <a:blip r:embed="rId7"/>
                   <a:stretch>
-                    <a:fillRect r="-370" b="-2941"/>
+                    <a:fillRect b="-2941"/>
                   </a:stretch>
                 </a:blipFill>
               </p:spPr>
@@ -21118,8 +21062,8 @@
             </a:fontRef>
           </p:style>
         </p:cxnSp>
-        <mc:AlternateContent xmlns:mc="http://schemas.openxmlformats.org/markup-compatibility/2006">
-          <mc:Choice xmlns:a14="http://schemas.microsoft.com/office/drawing/2010/main" Requires="a14">
+        <mc:AlternateContent xmlns:mc="http://schemas.openxmlformats.org/markup-compatibility/2006" xmlns:a14="http://schemas.microsoft.com/office/drawing/2010/main">
+          <mc:Choice Requires="a14">
             <p:sp>
               <p:nvSpPr>
                 <p:cNvPr id="23" name="TextBox 22"/>
@@ -21197,7 +21141,7 @@
               </p:txBody>
             </p:sp>
           </mc:Choice>
-          <mc:Fallback>
+          <mc:Fallback xmlns="">
             <p:sp>
               <p:nvSpPr>
                 <p:cNvPr id="23" name="TextBox 22"/>
@@ -21275,8 +21219,8 @@
         </p:nvSpPr>
         <p:spPr>
           <a:xfrm>
-            <a:off x="5562600" y="3060378"/>
-            <a:ext cx="3429000" cy="3323987"/>
+            <a:off x="5562600" y="5181600"/>
+            <a:ext cx="3429000" cy="1323439"/>
           </a:xfrm>
           <a:prstGeom prst="rect">
             <a:avLst/>
@@ -21290,113 +21234,179 @@
           <a:lstStyle/>
           <a:p>
             <a:r>
-              <a:rPr lang="en-US" sz="1400" dirty="0" smtClean="0"/>
+              <a:rPr lang="en-US" sz="800" dirty="0" smtClean="0"/>
               <a:t>Different </a:t>
             </a:r>
             <a:r>
-              <a:rPr lang="en-US" sz="1400" dirty="0"/>
+              <a:rPr lang="en-US" sz="800" dirty="0"/>
               <a:t>models have been implemented: n-grams (n = 1,2,3), linear interpolation (n-grams, n = 1,2,3) with Good Turing smoothing and "Stupid" </a:t>
             </a:r>
             <a:r>
-              <a:rPr lang="en-US" sz="1400" dirty="0" err="1"/>
+              <a:rPr lang="en-US" sz="800" dirty="0" err="1"/>
               <a:t>backoff</a:t>
             </a:r>
             <a:r>
-              <a:rPr lang="en-US" sz="1400" dirty="0"/>
+              <a:rPr lang="en-US" sz="800" dirty="0"/>
               <a:t> (with no discount</a:t>
             </a:r>
             <a:r>
-              <a:rPr lang="en-US" sz="1400" dirty="0" smtClean="0"/>
+              <a:rPr lang="en-US" sz="800" dirty="0" smtClean="0"/>
               <a:t>).</a:t>
             </a:r>
-            <a:endParaRPr lang="en-US" sz="1400" dirty="0"/>
-          </a:p>
-          <a:p>
-            <a:endParaRPr lang="en-US" sz="1400" dirty="0"/>
-          </a:p>
-          <a:p>
-            <a:r>
-              <a:rPr lang="en-US" sz="1400" dirty="0" smtClean="0"/>
+            <a:endParaRPr lang="en-US" sz="800" dirty="0"/>
+          </a:p>
+          <a:p>
+            <a:endParaRPr lang="en-US" sz="800" dirty="0"/>
+          </a:p>
+          <a:p>
+            <a:r>
+              <a:rPr lang="en-US" sz="800" dirty="0" smtClean="0"/>
               <a:t>The </a:t>
             </a:r>
             <a:r>
-              <a:rPr lang="en-US" sz="1400" dirty="0"/>
+              <a:rPr lang="en-US" sz="800" dirty="0"/>
               <a:t>model evaluations has been done using the </a:t>
             </a:r>
             <a:r>
-              <a:rPr lang="en-US" sz="1400" b="1" dirty="0" smtClean="0"/>
+              <a:rPr lang="en-US" sz="800" b="1" dirty="0" smtClean="0"/>
               <a:t>perplexity </a:t>
             </a:r>
             <a:r>
-              <a:rPr lang="en-US" sz="1400" b="1" dirty="0"/>
+              <a:rPr lang="en-US" sz="800" b="1" dirty="0"/>
               <a:t>measurement</a:t>
             </a:r>
             <a:r>
-              <a:rPr lang="en-US" sz="1400" dirty="0"/>
+              <a:rPr lang="en-US" sz="800" dirty="0"/>
               <a:t> and an </a:t>
             </a:r>
             <a:r>
-              <a:rPr lang="en-US" sz="1400" b="1" dirty="0" smtClean="0"/>
+              <a:rPr lang="en-US" sz="800" b="1" dirty="0" smtClean="0"/>
               <a:t>ad-hoc </a:t>
             </a:r>
             <a:r>
-              <a:rPr lang="en-US" sz="1400" b="1" dirty="0"/>
+              <a:rPr lang="en-US" sz="800" b="1" dirty="0"/>
               <a:t>testing </a:t>
             </a:r>
             <a:r>
-              <a:rPr lang="en-US" sz="1400" b="1" dirty="0" smtClean="0"/>
+              <a:rPr lang="en-US" sz="800" b="1" dirty="0" smtClean="0"/>
               <a:t>dataset</a:t>
             </a:r>
             <a:r>
-              <a:rPr lang="en-US" sz="1400" dirty="0" smtClean="0"/>
+              <a:rPr lang="en-US" sz="800" dirty="0" smtClean="0"/>
               <a:t> </a:t>
             </a:r>
             <a:r>
-              <a:rPr lang="en-US" sz="1400" dirty="0"/>
+              <a:rPr lang="en-US" sz="800" dirty="0"/>
               <a:t>(around 40 sentences). </a:t>
             </a:r>
-            <a:endParaRPr lang="en-US" sz="1400" dirty="0" smtClean="0"/>
-          </a:p>
-          <a:p>
-            <a:endParaRPr lang="en-US" sz="1400" dirty="0"/>
-          </a:p>
-          <a:p>
-            <a:r>
-              <a:rPr lang="en-US" sz="1400" dirty="0" smtClean="0"/>
+            <a:endParaRPr lang="en-US" sz="800" dirty="0" smtClean="0"/>
+          </a:p>
+          <a:p>
+            <a:endParaRPr lang="en-US" sz="800" dirty="0"/>
+          </a:p>
+          <a:p>
+            <a:r>
+              <a:rPr lang="en-US" sz="800" dirty="0" smtClean="0"/>
               <a:t>The </a:t>
             </a:r>
             <a:r>
-              <a:rPr lang="en-US" sz="1400" b="1" dirty="0"/>
+              <a:rPr lang="en-US" sz="800" b="1" dirty="0"/>
               <a:t>"Stupid" </a:t>
             </a:r>
             <a:r>
-              <a:rPr lang="en-US" sz="1400" b="1" dirty="0" err="1" smtClean="0"/>
+              <a:rPr lang="en-US" sz="800" b="1" dirty="0" err="1" smtClean="0"/>
               <a:t>backoff</a:t>
             </a:r>
             <a:r>
-              <a:rPr lang="en-US" sz="1400" b="1" dirty="0" smtClean="0"/>
+              <a:rPr lang="en-US" sz="800" b="1" dirty="0" smtClean="0"/>
               <a:t> </a:t>
             </a:r>
             <a:r>
-              <a:rPr lang="en-US" sz="1400" b="1" dirty="0"/>
+              <a:rPr lang="en-US" sz="800" b="1" dirty="0"/>
               <a:t>model</a:t>
             </a:r>
             <a:r>
-              <a:rPr lang="en-US" sz="1400" dirty="0"/>
+              <a:rPr lang="en-US" sz="800" dirty="0"/>
               <a:t> was the one able to </a:t>
             </a:r>
             <a:r>
-              <a:rPr lang="en-US" sz="1400" b="1" dirty="0"/>
+              <a:rPr lang="en-US" sz="800" b="1" dirty="0"/>
               <a:t>minimize the </a:t>
             </a:r>
             <a:r>
-              <a:rPr lang="en-US" sz="1400" b="1" dirty="0" smtClean="0"/>
+              <a:rPr lang="en-US" sz="800" b="1" dirty="0" smtClean="0"/>
               <a:t>perplexity measurement.</a:t>
             </a:r>
-            <a:endParaRPr lang="en-US" sz="1400" b="1" dirty="0"/>
-          </a:p>
-          <a:p>
-            <a:endParaRPr lang="en-US" sz="1400" dirty="0"/>
+            <a:endParaRPr lang="en-US" sz="800" b="1" dirty="0"/>
+          </a:p>
+          <a:p>
+            <a:endParaRPr lang="en-US" sz="800" dirty="0"/>
+          </a:p>
+        </p:txBody>
+      </p:sp>
+      <p:sp>
+        <p:nvSpPr>
+          <p:cNvPr id="25" name="TextBox 24"/>
+          <p:cNvSpPr txBox="1"/>
+          <p:nvPr/>
+        </p:nvSpPr>
+        <p:spPr>
+          <a:xfrm>
+            <a:off x="5257800" y="3653282"/>
+            <a:ext cx="2286000" cy="1015663"/>
+          </a:xfrm>
+          <a:prstGeom prst="rect">
+            <a:avLst/>
+          </a:prstGeom>
+          <a:noFill/>
+        </p:spPr>
+        <p:txBody>
+          <a:bodyPr wrap="square" rtlCol="0">
+            <a:spAutoFit/>
+          </a:bodyPr>
+          <a:lstStyle/>
+          <a:p>
+            <a:r>
+              <a:rPr lang="nb-NO" sz="1200" dirty="0" smtClean="0"/>
+              <a:t>«OTH» has been </a:t>
+            </a:r>
+            <a:r>
+              <a:rPr lang="nb-NO" sz="1200" dirty="0" smtClean="0"/>
+              <a:t>introduces when reducing </a:t>
+            </a:r>
+            <a:r>
+              <a:rPr lang="nb-NO" sz="1200" dirty="0" smtClean="0"/>
+              <a:t>the </a:t>
+            </a:r>
+            <a:r>
+              <a:rPr lang="nb-NO" sz="1200" dirty="0" smtClean="0"/>
+              <a:t>unigram vocabulary size</a:t>
+            </a:r>
+            <a:r>
+              <a:rPr lang="nb-NO" sz="1200" dirty="0" smtClean="0"/>
+              <a:t>. All </a:t>
+            </a:r>
+            <a:r>
+              <a:rPr lang="nb-NO" sz="1200" b="1" dirty="0" smtClean="0"/>
+              <a:t>left </a:t>
+            </a:r>
+            <a:r>
+              <a:rPr lang="nb-NO" sz="1200" b="1" dirty="0" smtClean="0"/>
+              <a:t>out unigrams</a:t>
+            </a:r>
+            <a:r>
+              <a:rPr lang="nb-NO" sz="1200" dirty="0" smtClean="0"/>
+              <a:t> have been associated to «</a:t>
+            </a:r>
+            <a:r>
+              <a:rPr lang="nb-NO" sz="1200" b="1" dirty="0" smtClean="0"/>
+              <a:t>OTH</a:t>
+            </a:r>
+            <a:r>
+              <a:rPr lang="nb-NO" sz="1200" dirty="0" smtClean="0"/>
+              <a:t>».</a:t>
+            </a:r>
+            <a:endParaRPr lang="en-US" sz="1200" dirty="0"/>
           </a:p>
         </p:txBody>
       </p:sp>

</xml_diff>

<commit_message>
presentation for the MeetUp - wip
</commit_message>
<xml_diff>
--- a/notes/lessonLearned.pptx
+++ b/notes/lessonLearned.pptx
@@ -124,6 +124,22 @@
       </a:defRPr>
     </a:lvl9pPr>
   </p:defaultTextStyle>
+  <p:extLst>
+    <p:ext uri="{EFAFB233-063F-42B5-8137-9DF3F51BA10A}">
+      <p15:sldGuideLst xmlns:p15="http://schemas.microsoft.com/office/powerpoint/2012/main">
+        <p15:guide id="1" orient="horz" pos="2160">
+          <p15:clr>
+            <a:srgbClr val="A4A3A4"/>
+          </p15:clr>
+        </p15:guide>
+        <p15:guide id="2" pos="2880">
+          <p15:clr>
+            <a:srgbClr val="A4A3A4"/>
+          </p15:clr>
+        </p15:guide>
+      </p15:sldGuideLst>
+    </p:ext>
+  </p:extLst>
 </p:presentation>
 </file>
 
@@ -5890,7 +5906,7 @@
           <a:p>
             <a:fld id="{747E30E7-5212-46F5-8AA5-1DC2CEE2B3BD}" type="datetimeFigureOut">
               <a:rPr lang="en-US" smtClean="0"/>
-              <a:t>5/28/2016</a:t>
+              <a:t>7/21/2016</a:t>
             </a:fld>
             <a:endParaRPr lang="en-US"/>
           </a:p>
@@ -7198,7 +7214,7 @@
             <a:fld id="{1D8BD707-D9CF-40AE-B4C6-C98DA3205C09}" type="datetimeFigureOut">
               <a:rPr lang="en-US" smtClean="0"/>
               <a:pPr/>
-              <a:t>5/28/2016</a:t>
+              <a:t>7/21/2016</a:t>
             </a:fld>
             <a:endParaRPr lang="en-US"/>
           </a:p>
@@ -7370,7 +7386,7 @@
             <a:fld id="{1D8BD707-D9CF-40AE-B4C6-C98DA3205C09}" type="datetimeFigureOut">
               <a:rPr lang="en-US" smtClean="0"/>
               <a:pPr/>
-              <a:t>5/28/2016</a:t>
+              <a:t>7/21/2016</a:t>
             </a:fld>
             <a:endParaRPr lang="en-US"/>
           </a:p>
@@ -7547,7 +7563,7 @@
             <a:fld id="{1D8BD707-D9CF-40AE-B4C6-C98DA3205C09}" type="datetimeFigureOut">
               <a:rPr lang="en-US" smtClean="0"/>
               <a:pPr/>
-              <a:t>5/28/2016</a:t>
+              <a:t>7/21/2016</a:t>
             </a:fld>
             <a:endParaRPr lang="en-US"/>
           </a:p>
@@ -7714,7 +7730,7 @@
             <a:fld id="{1D8BD707-D9CF-40AE-B4C6-C98DA3205C09}" type="datetimeFigureOut">
               <a:rPr lang="en-US" smtClean="0"/>
               <a:pPr/>
-              <a:t>5/28/2016</a:t>
+              <a:t>7/21/2016</a:t>
             </a:fld>
             <a:endParaRPr lang="en-US"/>
           </a:p>
@@ -7973,7 +7989,7 @@
             <a:fld id="{1D8BD707-D9CF-40AE-B4C6-C98DA3205C09}" type="datetimeFigureOut">
               <a:rPr lang="en-US" smtClean="0"/>
               <a:pPr/>
-              <a:t>5/28/2016</a:t>
+              <a:t>7/21/2016</a:t>
             </a:fld>
             <a:endParaRPr lang="en-US"/>
           </a:p>
@@ -8115,7 +8131,7 @@
             <a:fld id="{1D8BD707-D9CF-40AE-B4C6-C98DA3205C09}" type="datetimeFigureOut">
               <a:rPr lang="en-US" smtClean="0"/>
               <a:pPr/>
-              <a:t>5/28/2016</a:t>
+              <a:t>7/21/2016</a:t>
             </a:fld>
             <a:endParaRPr lang="en-US"/>
           </a:p>
@@ -8767,7 +8783,7 @@
             <a:fld id="{1D8BD707-D9CF-40AE-B4C6-C98DA3205C09}" type="datetimeFigureOut">
               <a:rPr lang="en-US" smtClean="0"/>
               <a:pPr/>
-              <a:t>5/28/2016</a:t>
+              <a:t>7/21/2016</a:t>
             </a:fld>
             <a:endParaRPr lang="en-US"/>
           </a:p>
@@ -8882,7 +8898,7 @@
             <a:fld id="{1D8BD707-D9CF-40AE-B4C6-C98DA3205C09}" type="datetimeFigureOut">
               <a:rPr lang="en-US" smtClean="0"/>
               <a:pPr/>
-              <a:t>5/28/2016</a:t>
+              <a:t>7/21/2016</a:t>
             </a:fld>
             <a:endParaRPr lang="en-US"/>
           </a:p>
@@ -8974,7 +8990,7 @@
             <a:fld id="{1D8BD707-D9CF-40AE-B4C6-C98DA3205C09}" type="datetimeFigureOut">
               <a:rPr lang="en-US" smtClean="0"/>
               <a:pPr/>
-              <a:t>5/28/2016</a:t>
+              <a:t>7/21/2016</a:t>
             </a:fld>
             <a:endParaRPr lang="en-US"/>
           </a:p>
@@ -9266,7 +9282,7 @@
             <a:fld id="{1D8BD707-D9CF-40AE-B4C6-C98DA3205C09}" type="datetimeFigureOut">
               <a:rPr lang="en-US" smtClean="0"/>
               <a:pPr/>
-              <a:t>5/28/2016</a:t>
+              <a:t>7/21/2016</a:t>
             </a:fld>
             <a:endParaRPr lang="en-US"/>
           </a:p>
@@ -9591,7 +9607,7 @@
             <a:fld id="{1D8BD707-D9CF-40AE-B4C6-C98DA3205C09}" type="datetimeFigureOut">
               <a:rPr lang="en-US" smtClean="0"/>
               <a:pPr/>
-              <a:t>5/28/2016</a:t>
+              <a:t>7/21/2016</a:t>
             </a:fld>
             <a:endParaRPr lang="en-US"/>
           </a:p>
@@ -10050,7 +10066,7 @@
             <a:fld id="{1D8BD707-D9CF-40AE-B4C6-C98DA3205C09}" type="datetimeFigureOut">
               <a:rPr lang="en-US" smtClean="0"/>
               <a:pPr/>
-              <a:t>5/28/2016</a:t>
+              <a:t>7/21/2016</a:t>
             </a:fld>
             <a:endParaRPr lang="en-US"/>
           </a:p>
@@ -10578,7 +10594,7 @@
           <a:p>
             <a:r>
               <a:rPr lang="nb-NO" sz="5400" dirty="0" smtClean="0"/>
-              <a:t>A Text Prediction App</a:t>
+              <a:t>Language Models</a:t>
             </a:r>
             <a:endParaRPr lang="en-US" sz="5400" dirty="0"/>
           </a:p>
@@ -10596,12 +10612,53 @@
         </p:nvSpPr>
         <p:spPr/>
         <p:txBody>
-          <a:bodyPr/>
+          <a:bodyPr>
+            <a:normAutofit fontScale="92500" lnSpcReduction="20000"/>
+          </a:bodyPr>
           <a:lstStyle/>
           <a:p>
             <a:r>
+              <a:rPr lang="nb-NO" sz="2400" dirty="0"/>
+              <a:t>A </a:t>
+            </a:r>
+            <a:r>
+              <a:rPr lang="nb-NO" sz="2400" dirty="0" err="1"/>
+              <a:t>Text</a:t>
+            </a:r>
+            <a:r>
+              <a:rPr lang="nb-NO" sz="2400" dirty="0"/>
+              <a:t> </a:t>
+            </a:r>
+            <a:r>
+              <a:rPr lang="nb-NO" sz="2400" dirty="0" err="1"/>
+              <a:t>Prediction</a:t>
+            </a:r>
+            <a:r>
+              <a:rPr lang="nb-NO" sz="2400" dirty="0"/>
+              <a:t> </a:t>
+            </a:r>
+            <a:r>
+              <a:rPr lang="nb-NO" sz="2400" dirty="0" err="1" smtClean="0"/>
+              <a:t>App</a:t>
+            </a:r>
+            <a:r>
+              <a:rPr lang="nb-NO" sz="2400" dirty="0" smtClean="0"/>
+              <a:t>:</a:t>
+            </a:r>
+            <a:endParaRPr lang="nb-NO" dirty="0" smtClean="0"/>
+          </a:p>
+          <a:p>
+            <a:r>
+              <a:rPr lang="nb-NO" dirty="0" err="1" smtClean="0"/>
+              <a:t>Developing</a:t>
+            </a:r>
+            <a:r>
               <a:rPr lang="nb-NO" dirty="0" smtClean="0"/>
-              <a:t>Developing a predictive model for text prediction</a:t>
+              <a:t> </a:t>
+            </a:r>
+            <a:r>
+              <a:rPr lang="nb-NO" dirty="0" smtClean="0"/>
+              <a:t>a predictive model for text prediction</a:t>
             </a:r>
             <a:endParaRPr lang="en-US" dirty="0"/>
           </a:p>
@@ -21368,31 +21425,11 @@
           <a:p>
             <a:r>
               <a:rPr lang="nb-NO" sz="1200" dirty="0" smtClean="0"/>
-              <a:t>«OTH» has been </a:t>
-            </a:r>
-            <a:r>
-              <a:rPr lang="nb-NO" sz="1200" dirty="0" smtClean="0"/>
-              <a:t>introduces when reducing </a:t>
-            </a:r>
-            <a:r>
-              <a:rPr lang="nb-NO" sz="1200" dirty="0" smtClean="0"/>
-              <a:t>the </a:t>
-            </a:r>
-            <a:r>
-              <a:rPr lang="nb-NO" sz="1200" dirty="0" smtClean="0"/>
-              <a:t>unigram vocabulary size</a:t>
-            </a:r>
-            <a:r>
-              <a:rPr lang="nb-NO" sz="1200" dirty="0" smtClean="0"/>
-              <a:t>. All </a:t>
+              <a:t>«OTH» has been introduces when reducing the unigram vocabulary size. All </a:t>
             </a:r>
             <a:r>
               <a:rPr lang="nb-NO" sz="1200" b="1" dirty="0" smtClean="0"/>
-              <a:t>left </a:t>
-            </a:r>
-            <a:r>
-              <a:rPr lang="nb-NO" sz="1200" b="1" dirty="0" smtClean="0"/>
-              <a:t>out unigrams</a:t>
+              <a:t>left out unigrams</a:t>
             </a:r>
             <a:r>
               <a:rPr lang="nb-NO" sz="1200" dirty="0" smtClean="0"/>

</xml_diff>